<commit_message>
lecture code week 7
</commit_message>
<xml_diff>
--- a/lecture/lecture_week_07.pptx
+++ b/lecture/lecture_week_07.pptx
@@ -5704,7 +5704,7 @@
             </a:r>
             <a:r>
               <a:rPr lang="en-US" b="1" dirty="0"/>
-              <a:t>(10000, size = 9, prob = samples)</a:t>
+              <a:t>(10000, size = 10, prob = samples)</a:t>
             </a:r>
           </a:p>
           <a:p>
@@ -5713,7 +5713,7 @@
           <a:p>
             <a:r>
               <a:rPr lang="en-US" dirty="0"/>
-              <a:t>Draws 10,000 random samples from a binomial distribution of outcomes of 9 trials</a:t>
+              <a:t>Draws 10,000 random samples from a binomial distribution of outcomes of 10 trials</a:t>
             </a:r>
           </a:p>
           <a:p>

</xml_diff>